<commit_message>
Accommodate the example plan to shift in xticks.
</commit_message>
<xml_diff>
--- a/Spotlight_PPT.pptx
+++ b/Spotlight_PPT.pptx
@@ -107,6 +107,11 @@
       </a:defRPr>
     </a:lvl9pPr>
   </p:defaultTextStyle>
+  <p:extLst>
+    <p:ext uri="{EFAFB233-063F-42B5-8137-9DF3F51BA10A}">
+      <p15:sldGuideLst xmlns:p15="http://schemas.microsoft.com/office/powerpoint/2012/main"/>
+    </p:ext>
+  </p:extLst>
 </p:presentation>
 </file>
 
@@ -3579,10 +3584,10 @@
       </p:sp>
       <p:pic>
         <p:nvPicPr>
-          <p:cNvPr id="13" name="Kuva 12" descr="Kuva, joka sisältää kohteen teksti, viiva, Tontti, kuvakaappaus&#10;&#10;Kuvaus luotu automaattisesti">
-            <a:extLst>
-              <a:ext uri="{FF2B5EF4-FFF2-40B4-BE49-F238E27FC236}">
-                <a16:creationId xmlns:a16="http://schemas.microsoft.com/office/drawing/2014/main" id="{4DA0F761-6ECB-0FF0-F374-C43A1DB7BB3F}"/>
+          <p:cNvPr id="5" name="Kuva 4">
+            <a:extLst>
+              <a:ext uri="{FF2B5EF4-FFF2-40B4-BE49-F238E27FC236}">
+                <a16:creationId xmlns:a16="http://schemas.microsoft.com/office/drawing/2014/main" id="{F8D78C56-9983-B1CC-DDFC-9EAC1F3CE9B4}"/>
               </a:ext>
             </a:extLst>
           </p:cNvPr>
@@ -3751,10 +3756,10 @@
       </p:sp>
       <p:pic>
         <p:nvPicPr>
-          <p:cNvPr id="11" name="Kuva 10" descr="Kuva, joka sisältää kohteen teksti, viiva, Tontti, diagrammi&#10;&#10;Kuvaus luotu automaattisesti">
-            <a:extLst>
-              <a:ext uri="{FF2B5EF4-FFF2-40B4-BE49-F238E27FC236}">
-                <a16:creationId xmlns:a16="http://schemas.microsoft.com/office/drawing/2014/main" id="{34F66EE5-FDC6-31B2-07D4-4445E998488D}"/>
+          <p:cNvPr id="4" name="Kuva 3" descr="Kuva, joka sisältää kohteen teksti, viiva, Tontti, diagrammi&#10;&#10;Kuvaus luotu automaattisesti">
+            <a:extLst>
+              <a:ext uri="{FF2B5EF4-FFF2-40B4-BE49-F238E27FC236}">
+                <a16:creationId xmlns:a16="http://schemas.microsoft.com/office/drawing/2014/main" id="{06FCF00F-614F-5664-9D4D-F67689BC2269}"/>
               </a:ext>
             </a:extLst>
           </p:cNvPr>
@@ -3935,10 +3940,10 @@
       </p:sp>
       <p:pic>
         <p:nvPicPr>
-          <p:cNvPr id="9" name="Kuva 8" descr="Kuva, joka sisältää kohteen teksti, viiva, Tontti, diagrammi&#10;&#10;Kuvaus luotu automaattisesti">
-            <a:extLst>
-              <a:ext uri="{FF2B5EF4-FFF2-40B4-BE49-F238E27FC236}">
-                <a16:creationId xmlns:a16="http://schemas.microsoft.com/office/drawing/2014/main" id="{53EB1842-9854-4255-3055-463A1DBAAA09}"/>
+          <p:cNvPr id="4" name="Kuva 3" descr="Kuva, joka sisältää kohteen teksti, Tontti, viiva, diagrammi&#10;&#10;Kuvaus luotu automaattisesti">
+            <a:extLst>
+              <a:ext uri="{FF2B5EF4-FFF2-40B4-BE49-F238E27FC236}">
+                <a16:creationId xmlns:a16="http://schemas.microsoft.com/office/drawing/2014/main" id="{F4E72962-124A-59AA-49C7-57C3CC436885}"/>
               </a:ext>
             </a:extLst>
           </p:cNvPr>

</xml_diff>